<commit_message>
Atualiza capítulo 1a e 1b e imagens do MapReduce
</commit_message>
<xml_diff>
--- a/images/map-reduce-word-counting.pptx
+++ b/images/map-reduce-word-counting.pptx
@@ -197,7 +197,7 @@
           <a:p>
             <a:fld id="{492CB715-E81E-E041-A381-A6865AB74646}" type="datetimeFigureOut">
               <a:rPr lang="en-US" smtClean="0"/>
-              <a:t>9/25/18</a:t>
+              <a:t>9/28/18</a:t>
             </a:fld>
             <a:endParaRPr lang="en-US"/>
           </a:p>
@@ -715,7 +715,7 @@
           <a:p>
             <a:fld id="{F69E2DF0-B77F-AD4A-B6BB-9598DF853393}" type="datetimeFigureOut">
               <a:rPr lang="en-US" smtClean="0"/>
-              <a:t>9/25/18</a:t>
+              <a:t>9/28/18</a:t>
             </a:fld>
             <a:endParaRPr lang="en-US"/>
           </a:p>
@@ -885,7 +885,7 @@
           <a:p>
             <a:fld id="{F69E2DF0-B77F-AD4A-B6BB-9598DF853393}" type="datetimeFigureOut">
               <a:rPr lang="en-US" smtClean="0"/>
-              <a:t>9/25/18</a:t>
+              <a:t>9/28/18</a:t>
             </a:fld>
             <a:endParaRPr lang="en-US"/>
           </a:p>
@@ -1065,7 +1065,7 @@
           <a:p>
             <a:fld id="{F69E2DF0-B77F-AD4A-B6BB-9598DF853393}" type="datetimeFigureOut">
               <a:rPr lang="en-US" smtClean="0"/>
-              <a:t>9/25/18</a:t>
+              <a:t>9/28/18</a:t>
             </a:fld>
             <a:endParaRPr lang="en-US"/>
           </a:p>
@@ -1235,7 +1235,7 @@
           <a:p>
             <a:fld id="{F69E2DF0-B77F-AD4A-B6BB-9598DF853393}" type="datetimeFigureOut">
               <a:rPr lang="en-US" smtClean="0"/>
-              <a:t>9/25/18</a:t>
+              <a:t>9/28/18</a:t>
             </a:fld>
             <a:endParaRPr lang="en-US"/>
           </a:p>
@@ -1481,7 +1481,7 @@
           <a:p>
             <a:fld id="{F69E2DF0-B77F-AD4A-B6BB-9598DF853393}" type="datetimeFigureOut">
               <a:rPr lang="en-US" smtClean="0"/>
-              <a:t>9/25/18</a:t>
+              <a:t>9/28/18</a:t>
             </a:fld>
             <a:endParaRPr lang="en-US"/>
           </a:p>
@@ -1713,7 +1713,7 @@
           <a:p>
             <a:fld id="{F69E2DF0-B77F-AD4A-B6BB-9598DF853393}" type="datetimeFigureOut">
               <a:rPr lang="en-US" smtClean="0"/>
-              <a:t>9/25/18</a:t>
+              <a:t>9/28/18</a:t>
             </a:fld>
             <a:endParaRPr lang="en-US"/>
           </a:p>
@@ -2080,7 +2080,7 @@
           <a:p>
             <a:fld id="{F69E2DF0-B77F-AD4A-B6BB-9598DF853393}" type="datetimeFigureOut">
               <a:rPr lang="en-US" smtClean="0"/>
-              <a:t>9/25/18</a:t>
+              <a:t>9/28/18</a:t>
             </a:fld>
             <a:endParaRPr lang="en-US"/>
           </a:p>
@@ -2198,7 +2198,7 @@
           <a:p>
             <a:fld id="{F69E2DF0-B77F-AD4A-B6BB-9598DF853393}" type="datetimeFigureOut">
               <a:rPr lang="en-US" smtClean="0"/>
-              <a:t>9/25/18</a:t>
+              <a:t>9/28/18</a:t>
             </a:fld>
             <a:endParaRPr lang="en-US"/>
           </a:p>
@@ -2293,7 +2293,7 @@
           <a:p>
             <a:fld id="{F69E2DF0-B77F-AD4A-B6BB-9598DF853393}" type="datetimeFigureOut">
               <a:rPr lang="en-US" smtClean="0"/>
-              <a:t>9/25/18</a:t>
+              <a:t>9/28/18</a:t>
             </a:fld>
             <a:endParaRPr lang="en-US"/>
           </a:p>
@@ -2570,7 +2570,7 @@
           <a:p>
             <a:fld id="{F69E2DF0-B77F-AD4A-B6BB-9598DF853393}" type="datetimeFigureOut">
               <a:rPr lang="en-US" smtClean="0"/>
-              <a:t>9/25/18</a:t>
+              <a:t>9/28/18</a:t>
             </a:fld>
             <a:endParaRPr lang="en-US"/>
           </a:p>
@@ -2827,7 +2827,7 @@
           <a:p>
             <a:fld id="{F69E2DF0-B77F-AD4A-B6BB-9598DF853393}" type="datetimeFigureOut">
               <a:rPr lang="en-US" smtClean="0"/>
-              <a:t>9/25/18</a:t>
+              <a:t>9/28/18</a:t>
             </a:fld>
             <a:endParaRPr lang="en-US"/>
           </a:p>
@@ -3040,7 +3040,7 @@
           <a:p>
             <a:fld id="{F69E2DF0-B77F-AD4A-B6BB-9598DF853393}" type="datetimeFigureOut">
               <a:rPr lang="en-US" smtClean="0"/>
-              <a:t>9/25/18</a:t>
+              <a:t>9/28/18</a:t>
             </a:fld>
             <a:endParaRPr lang="en-US"/>
           </a:p>
@@ -3459,7 +3459,7 @@
         </p:nvSpPr>
         <p:spPr>
           <a:xfrm>
-            <a:off x="94677" y="727476"/>
+            <a:off x="94677" y="821922"/>
             <a:ext cx="590303" cy="403307"/>
           </a:xfrm>
           <a:prstGeom prst="rect">
@@ -3528,7 +3528,7 @@
         </p:nvSpPr>
         <p:spPr>
           <a:xfrm>
-            <a:off x="849790" y="404012"/>
+            <a:off x="849790" y="498458"/>
             <a:ext cx="590303" cy="169221"/>
           </a:xfrm>
           <a:prstGeom prst="rect">
@@ -3583,7 +3583,7 @@
         </p:nvSpPr>
         <p:spPr>
           <a:xfrm>
-            <a:off x="849790" y="844518"/>
+            <a:off x="849790" y="938964"/>
             <a:ext cx="590303" cy="169221"/>
           </a:xfrm>
           <a:prstGeom prst="rect">
@@ -3638,7 +3638,7 @@
         </p:nvSpPr>
         <p:spPr>
           <a:xfrm>
-            <a:off x="849790" y="1285670"/>
+            <a:off x="849790" y="1380116"/>
             <a:ext cx="590303" cy="169221"/>
           </a:xfrm>
           <a:prstGeom prst="rect">
@@ -3693,7 +3693,7 @@
         </p:nvSpPr>
         <p:spPr>
           <a:xfrm>
-            <a:off x="1652537" y="331381"/>
+            <a:off x="1652537" y="425827"/>
             <a:ext cx="366532" cy="314482"/>
           </a:xfrm>
           <a:prstGeom prst="rect">
@@ -3765,7 +3765,7 @@
         </p:nvSpPr>
         <p:spPr>
           <a:xfrm>
-            <a:off x="1652537" y="770740"/>
+            <a:off x="1652537" y="865186"/>
             <a:ext cx="366532" cy="314482"/>
           </a:xfrm>
           <a:prstGeom prst="rect">
@@ -3834,7 +3834,7 @@
         </p:nvSpPr>
         <p:spPr>
           <a:xfrm>
-            <a:off x="1652537" y="1210098"/>
+            <a:off x="1652537" y="1304544"/>
             <a:ext cx="366532" cy="314482"/>
           </a:xfrm>
           <a:prstGeom prst="rect">
@@ -3903,7 +3903,7 @@
         </p:nvSpPr>
         <p:spPr>
           <a:xfrm>
-            <a:off x="2433265" y="100485"/>
+            <a:off x="2433265" y="194931"/>
             <a:ext cx="366532" cy="314482"/>
           </a:xfrm>
           <a:prstGeom prst="rect">
@@ -3965,7 +3965,7 @@
         </p:nvSpPr>
         <p:spPr>
           <a:xfrm>
-            <a:off x="2433265" y="515708"/>
+            <a:off x="2433265" y="610154"/>
             <a:ext cx="366532" cy="314482"/>
           </a:xfrm>
           <a:prstGeom prst="rect">
@@ -4034,7 +4034,7 @@
         </p:nvSpPr>
         <p:spPr>
           <a:xfrm>
-            <a:off x="2433265" y="960486"/>
+            <a:off x="2433265" y="1054932"/>
             <a:ext cx="366532" cy="314482"/>
           </a:xfrm>
           <a:prstGeom prst="rect">
@@ -4096,7 +4096,7 @@
         </p:nvSpPr>
         <p:spPr>
           <a:xfrm>
-            <a:off x="2433265" y="1367339"/>
+            <a:off x="2433265" y="1461785"/>
             <a:ext cx="366532" cy="314482"/>
           </a:xfrm>
           <a:prstGeom prst="rect">
@@ -4158,7 +4158,7 @@
         </p:nvSpPr>
         <p:spPr>
           <a:xfrm>
-            <a:off x="3049182" y="100485"/>
+            <a:off x="3049182" y="194931"/>
             <a:ext cx="366532" cy="314482"/>
           </a:xfrm>
           <a:prstGeom prst="rect">
@@ -4213,7 +4213,7 @@
         </p:nvSpPr>
         <p:spPr>
           <a:xfrm>
-            <a:off x="3049181" y="515708"/>
+            <a:off x="3049181" y="610154"/>
             <a:ext cx="366532" cy="314482"/>
           </a:xfrm>
           <a:prstGeom prst="rect">
@@ -4268,7 +4268,7 @@
         </p:nvSpPr>
         <p:spPr>
           <a:xfrm>
-            <a:off x="3049182" y="960486"/>
+            <a:off x="3049182" y="1054932"/>
             <a:ext cx="366532" cy="314482"/>
           </a:xfrm>
           <a:prstGeom prst="rect">
@@ -4323,7 +4323,7 @@
         </p:nvSpPr>
         <p:spPr>
           <a:xfrm>
-            <a:off x="3049181" y="1367339"/>
+            <a:off x="3049181" y="1461785"/>
             <a:ext cx="366532" cy="314482"/>
           </a:xfrm>
           <a:prstGeom prst="rect">
@@ -4378,7 +4378,7 @@
         </p:nvSpPr>
         <p:spPr>
           <a:xfrm>
-            <a:off x="3681281" y="727476"/>
+            <a:off x="3681281" y="821922"/>
             <a:ext cx="590303" cy="403307"/>
           </a:xfrm>
           <a:prstGeom prst="rect">
@@ -4458,13 +4458,16 @@
         </p:nvCxnSpPr>
         <p:spPr>
           <a:xfrm flipV="1">
-            <a:off x="684980" y="488622"/>
+            <a:off x="684980" y="583068"/>
             <a:ext cx="164810" cy="440507"/>
           </a:xfrm>
           <a:prstGeom prst="straightConnector1">
             <a:avLst/>
           </a:prstGeom>
           <a:ln w="9525">
+            <a:solidFill>
+              <a:schemeClr val="tx1"/>
+            </a:solidFill>
             <a:headEnd type="none" w="med" len="sm"/>
             <a:tailEnd type="triangle" w="sm" len="sm"/>
           </a:ln>
@@ -4502,13 +4505,16 @@
         </p:nvCxnSpPr>
         <p:spPr>
           <a:xfrm flipV="1">
-            <a:off x="684980" y="929128"/>
+            <a:off x="684980" y="1023574"/>
             <a:ext cx="164810" cy="1"/>
           </a:xfrm>
           <a:prstGeom prst="straightConnector1">
             <a:avLst/>
           </a:prstGeom>
           <a:ln w="9525">
+            <a:solidFill>
+              <a:schemeClr val="tx1"/>
+            </a:solidFill>
             <a:headEnd type="none" w="med" len="sm"/>
             <a:tailEnd type="triangle" w="sm" len="sm"/>
           </a:ln>
@@ -4546,13 +4552,16 @@
         </p:nvCxnSpPr>
         <p:spPr>
           <a:xfrm>
-            <a:off x="684980" y="929129"/>
+            <a:off x="684980" y="1023575"/>
             <a:ext cx="164810" cy="441151"/>
           </a:xfrm>
           <a:prstGeom prst="straightConnector1">
             <a:avLst/>
           </a:prstGeom>
           <a:ln w="9525">
+            <a:solidFill>
+              <a:schemeClr val="tx1"/>
+            </a:solidFill>
             <a:headEnd type="none" w="med" len="sm"/>
             <a:tailEnd type="triangle" w="sm" len="sm"/>
           </a:ln>
@@ -4589,13 +4598,16 @@
         </p:nvCxnSpPr>
         <p:spPr>
           <a:xfrm>
-            <a:off x="1440093" y="488622"/>
+            <a:off x="1440093" y="583068"/>
             <a:ext cx="212443" cy="0"/>
           </a:xfrm>
           <a:prstGeom prst="straightConnector1">
             <a:avLst/>
           </a:prstGeom>
           <a:ln w="9525">
+            <a:solidFill>
+              <a:schemeClr val="tx1"/>
+            </a:solidFill>
             <a:headEnd type="none" w="med" len="sm"/>
             <a:tailEnd type="triangle" w="sm" len="sm"/>
           </a:ln>
@@ -4632,13 +4644,16 @@
         </p:nvCxnSpPr>
         <p:spPr>
           <a:xfrm flipV="1">
-            <a:off x="1440093" y="927981"/>
+            <a:off x="1440093" y="1022427"/>
             <a:ext cx="212443" cy="1148"/>
           </a:xfrm>
           <a:prstGeom prst="straightConnector1">
             <a:avLst/>
           </a:prstGeom>
           <a:ln w="9525">
+            <a:solidFill>
+              <a:schemeClr val="tx1"/>
+            </a:solidFill>
             <a:headEnd type="none" w="med" len="sm"/>
             <a:tailEnd type="triangle" w="sm" len="sm"/>
           </a:ln>
@@ -4675,13 +4690,16 @@
         </p:nvCxnSpPr>
         <p:spPr>
           <a:xfrm flipV="1">
-            <a:off x="1440093" y="1367339"/>
+            <a:off x="1440093" y="1461785"/>
             <a:ext cx="212443" cy="2941"/>
           </a:xfrm>
           <a:prstGeom prst="straightConnector1">
             <a:avLst/>
           </a:prstGeom>
           <a:ln w="9525">
+            <a:solidFill>
+              <a:schemeClr val="tx1"/>
+            </a:solidFill>
             <a:headEnd type="none" w="med" len="sm"/>
             <a:tailEnd type="triangle" w="sm" len="sm"/>
           </a:ln>
@@ -4718,7 +4736,7 @@
         </p:nvCxnSpPr>
         <p:spPr>
           <a:xfrm flipV="1">
-            <a:off x="2019068" y="257726"/>
+            <a:off x="2019068" y="352172"/>
             <a:ext cx="414197" cy="230896"/>
           </a:xfrm>
           <a:prstGeom prst="straightConnector1">
@@ -4764,7 +4782,7 @@
         </p:nvCxnSpPr>
         <p:spPr>
           <a:xfrm flipV="1">
-            <a:off x="2019068" y="257726"/>
+            <a:off x="2019068" y="352172"/>
             <a:ext cx="414197" cy="1109613"/>
           </a:xfrm>
           <a:prstGeom prst="straightConnector1">
@@ -4810,7 +4828,7 @@
         </p:nvCxnSpPr>
         <p:spPr>
           <a:xfrm flipV="1">
-            <a:off x="2019069" y="672949"/>
+            <a:off x="2019069" y="767395"/>
             <a:ext cx="414196" cy="255032"/>
           </a:xfrm>
           <a:prstGeom prst="straightConnector1">
@@ -4856,7 +4874,7 @@
         </p:nvCxnSpPr>
         <p:spPr>
           <a:xfrm flipV="1">
-            <a:off x="2019069" y="672949"/>
+            <a:off x="2019069" y="767395"/>
             <a:ext cx="414196" cy="694391"/>
           </a:xfrm>
           <a:prstGeom prst="straightConnector1">
@@ -4903,7 +4921,7 @@
         </p:nvCxnSpPr>
         <p:spPr>
           <a:xfrm>
-            <a:off x="2019068" y="488622"/>
+            <a:off x="2019068" y="583068"/>
             <a:ext cx="414197" cy="629105"/>
           </a:xfrm>
           <a:prstGeom prst="straightConnector1">
@@ -4949,7 +4967,7 @@
         </p:nvCxnSpPr>
         <p:spPr>
           <a:xfrm flipV="1">
-            <a:off x="2019068" y="1117727"/>
+            <a:off x="2019068" y="1212173"/>
             <a:ext cx="414197" cy="249612"/>
           </a:xfrm>
           <a:prstGeom prst="straightConnector1">
@@ -4995,7 +5013,7 @@
         </p:nvCxnSpPr>
         <p:spPr>
           <a:xfrm>
-            <a:off x="2019069" y="488623"/>
+            <a:off x="2019069" y="583069"/>
             <a:ext cx="414196" cy="1035958"/>
           </a:xfrm>
           <a:prstGeom prst="straightConnector1">
@@ -5042,7 +5060,7 @@
         </p:nvCxnSpPr>
         <p:spPr>
           <a:xfrm>
-            <a:off x="2019069" y="927981"/>
+            <a:off x="2019069" y="1022427"/>
             <a:ext cx="414196" cy="596600"/>
           </a:xfrm>
           <a:prstGeom prst="straightConnector1">
@@ -5089,7 +5107,7 @@
         </p:nvCxnSpPr>
         <p:spPr>
           <a:xfrm>
-            <a:off x="2799797" y="257726"/>
+            <a:off x="2799797" y="352172"/>
             <a:ext cx="249385" cy="0"/>
           </a:xfrm>
           <a:prstGeom prst="straightConnector1">
@@ -5097,7 +5115,7 @@
           </a:prstGeom>
           <a:ln w="9525">
             <a:solidFill>
-              <a:schemeClr val="accent1"/>
+              <a:schemeClr val="tx1"/>
             </a:solidFill>
             <a:headEnd type="none" w="med" len="sm"/>
             <a:tailEnd type="triangle" w="sm" len="sm"/>
@@ -5135,13 +5153,16 @@
         </p:nvCxnSpPr>
         <p:spPr>
           <a:xfrm>
-            <a:off x="2799797" y="672949"/>
+            <a:off x="2799797" y="767395"/>
             <a:ext cx="249385" cy="0"/>
           </a:xfrm>
           <a:prstGeom prst="straightConnector1">
             <a:avLst/>
           </a:prstGeom>
           <a:ln w="9525">
+            <a:solidFill>
+              <a:schemeClr val="tx1"/>
+            </a:solidFill>
             <a:headEnd type="none" w="med" len="sm"/>
             <a:tailEnd type="triangle" w="sm" len="sm"/>
           </a:ln>
@@ -5178,13 +5199,16 @@
         </p:nvCxnSpPr>
         <p:spPr>
           <a:xfrm>
-            <a:off x="2799797" y="1117727"/>
+            <a:off x="2799797" y="1212173"/>
             <a:ext cx="249385" cy="0"/>
           </a:xfrm>
           <a:prstGeom prst="straightConnector1">
             <a:avLst/>
           </a:prstGeom>
           <a:ln w="9525">
+            <a:solidFill>
+              <a:schemeClr val="tx1"/>
+            </a:solidFill>
             <a:headEnd type="none" w="med" len="sm"/>
             <a:tailEnd type="triangle" w="sm" len="sm"/>
           </a:ln>
@@ -5221,13 +5245,16 @@
         </p:nvCxnSpPr>
         <p:spPr>
           <a:xfrm>
-            <a:off x="2799797" y="1524580"/>
+            <a:off x="2799797" y="1619026"/>
             <a:ext cx="249385" cy="0"/>
           </a:xfrm>
           <a:prstGeom prst="straightConnector1">
             <a:avLst/>
           </a:prstGeom>
           <a:ln w="9525">
+            <a:solidFill>
+              <a:schemeClr val="tx1"/>
+            </a:solidFill>
             <a:headEnd type="none" w="med" len="sm"/>
             <a:tailEnd type="triangle" w="sm" len="sm"/>
           </a:ln>
@@ -5265,13 +5292,16 @@
         </p:nvCxnSpPr>
         <p:spPr>
           <a:xfrm>
-            <a:off x="3415713" y="257727"/>
+            <a:off x="3415713" y="352173"/>
             <a:ext cx="265568" cy="671403"/>
           </a:xfrm>
           <a:prstGeom prst="straightConnector1">
             <a:avLst/>
           </a:prstGeom>
           <a:ln w="9525">
+            <a:solidFill>
+              <a:schemeClr val="tx1"/>
+            </a:solidFill>
             <a:headEnd type="none" w="med" len="sm"/>
             <a:tailEnd type="triangle" w="sm" len="sm"/>
           </a:ln>
@@ -5309,13 +5339,16 @@
         </p:nvCxnSpPr>
         <p:spPr>
           <a:xfrm>
-            <a:off x="3415713" y="672949"/>
+            <a:off x="3415713" y="767395"/>
             <a:ext cx="265569" cy="256180"/>
           </a:xfrm>
           <a:prstGeom prst="straightConnector1">
             <a:avLst/>
           </a:prstGeom>
           <a:ln w="9525">
+            <a:solidFill>
+              <a:schemeClr val="tx1"/>
+            </a:solidFill>
             <a:headEnd type="none" w="med" len="sm"/>
             <a:tailEnd type="triangle" w="sm" len="sm"/>
           </a:ln>
@@ -5352,13 +5385,16 @@
         </p:nvCxnSpPr>
         <p:spPr>
           <a:xfrm flipV="1">
-            <a:off x="3415713" y="929129"/>
+            <a:off x="3415713" y="1023575"/>
             <a:ext cx="265569" cy="188599"/>
           </a:xfrm>
           <a:prstGeom prst="straightConnector1">
             <a:avLst/>
           </a:prstGeom>
           <a:ln w="9525">
+            <a:solidFill>
+              <a:schemeClr val="tx1"/>
+            </a:solidFill>
             <a:headEnd type="none" w="med" len="sm"/>
             <a:tailEnd type="triangle" w="sm" len="sm"/>
           </a:ln>
@@ -5395,13 +5431,16 @@
         </p:nvCxnSpPr>
         <p:spPr>
           <a:xfrm flipV="1">
-            <a:off x="3415713" y="929129"/>
+            <a:off x="3415713" y="1023575"/>
             <a:ext cx="265569" cy="545519"/>
           </a:xfrm>
           <a:prstGeom prst="straightConnector1">
             <a:avLst/>
           </a:prstGeom>
           <a:ln w="9525">
+            <a:solidFill>
+              <a:schemeClr val="tx1"/>
+            </a:solidFill>
             <a:headEnd type="none" w="med" len="sm"/>
             <a:tailEnd type="triangle" w="sm" len="sm"/>
           </a:ln>
@@ -5421,6 +5460,143 @@
           </a:fontRef>
         </p:style>
       </p:cxnSp>
+      <p:sp>
+        <p:nvSpPr>
+          <p:cNvPr id="2" name="TextBox 1">
+            <a:extLst>
+              <a:ext uri="{FF2B5EF4-FFF2-40B4-BE49-F238E27FC236}">
+                <a16:creationId xmlns:a16="http://schemas.microsoft.com/office/drawing/2014/main" id="{58C4FC3A-1886-D249-9EFE-405A22CC8495}"/>
+              </a:ext>
+            </a:extLst>
+          </p:cNvPr>
+          <p:cNvSpPr txBox="1"/>
+          <p:nvPr/>
+        </p:nvSpPr>
+        <p:spPr>
+          <a:xfrm>
+            <a:off x="8583" y="-36891"/>
+            <a:ext cx="4306711" cy="254813"/>
+          </a:xfrm>
+          <a:prstGeom prst="rect">
+            <a:avLst/>
+          </a:prstGeom>
+          <a:noFill/>
+        </p:spPr>
+        <p:txBody>
+          <a:bodyPr wrap="square" rtlCol="0">
+            <a:spAutoFit/>
+          </a:bodyPr>
+          <a:lstStyle/>
+          <a:p>
+            <a:r>
+              <a:rPr lang="en-US" b="1" dirty="0"/>
+              <a:t>        </a:t>
+            </a:r>
+            <a:r>
+              <a:rPr lang="en-US" b="1" dirty="0" err="1"/>
+              <a:t>Fase</a:t>
+            </a:r>
+            <a:r>
+              <a:rPr lang="en-US" b="1" dirty="0"/>
+              <a:t> 1                                        </a:t>
+            </a:r>
+            <a:r>
+              <a:rPr lang="en-US" b="1" dirty="0" err="1"/>
+              <a:t>Fase</a:t>
+            </a:r>
+            <a:r>
+              <a:rPr lang="en-US" b="1" dirty="0"/>
+              <a:t>  2                                </a:t>
+            </a:r>
+            <a:r>
+              <a:rPr lang="en-US" b="1" dirty="0" err="1"/>
+              <a:t>Fase</a:t>
+            </a:r>
+            <a:r>
+              <a:rPr lang="en-US" b="1" dirty="0"/>
+              <a:t>  3                                     </a:t>
+            </a:r>
+            <a:r>
+              <a:rPr lang="en-US" b="1" dirty="0" err="1"/>
+              <a:t>Fase</a:t>
+            </a:r>
+            <a:r>
+              <a:rPr lang="en-US" b="1" dirty="0"/>
+              <a:t>  4                            </a:t>
+            </a:r>
+            <a:r>
+              <a:rPr lang="en-US" b="1" dirty="0" err="1"/>
+              <a:t>Fase</a:t>
+            </a:r>
+            <a:r>
+              <a:rPr lang="en-US" b="1" dirty="0"/>
+              <a:t> 5                                   </a:t>
+            </a:r>
+            <a:r>
+              <a:rPr lang="en-US" b="1" dirty="0" err="1"/>
+              <a:t>Fase</a:t>
+            </a:r>
+            <a:r>
+              <a:rPr lang="en-US" b="1" dirty="0"/>
+              <a:t> 6</a:t>
+            </a:r>
+          </a:p>
+          <a:p>
+            <a:r>
+              <a:rPr lang="en-US" b="1" dirty="0"/>
+              <a:t>Entrada de Dados                           </a:t>
+            </a:r>
+            <a:r>
+              <a:rPr lang="en-US" b="1" dirty="0" err="1"/>
+              <a:t>Divisão</a:t>
+            </a:r>
+            <a:r>
+              <a:rPr lang="en-US" b="1" dirty="0"/>
+              <a:t>                          </a:t>
+            </a:r>
+            <a:r>
+              <a:rPr lang="en-US" b="1" dirty="0" err="1"/>
+              <a:t>Mapeamento</a:t>
+            </a:r>
+            <a:r>
+              <a:rPr lang="en-US" b="1" dirty="0"/>
+              <a:t>                         </a:t>
+            </a:r>
+            <a:r>
+              <a:rPr lang="en-US" b="1" dirty="0" err="1"/>
+              <a:t>Agrupamento</a:t>
+            </a:r>
+            <a:r>
+              <a:rPr lang="en-US" b="1" dirty="0"/>
+              <a:t>                </a:t>
+            </a:r>
+            <a:r>
+              <a:rPr lang="en-US" b="1" dirty="0" err="1"/>
+              <a:t>Sumarização</a:t>
+            </a:r>
+            <a:r>
+              <a:rPr lang="en-US" b="1" dirty="0"/>
+              <a:t>                  </a:t>
+            </a:r>
+            <a:r>
+              <a:rPr lang="en-US" b="1" dirty="0" err="1"/>
+              <a:t>Saída</a:t>
+            </a:r>
+            <a:r>
+              <a:rPr lang="en-US" b="1" dirty="0"/>
+              <a:t> (</a:t>
+            </a:r>
+            <a:r>
+              <a:rPr lang="en-US" b="1" dirty="0" err="1"/>
+              <a:t>Resultados</a:t>
+            </a:r>
+            <a:r>
+              <a:rPr lang="en-US" b="1" dirty="0"/>
+              <a:t>)</a:t>
+            </a:r>
+          </a:p>
+        </p:txBody>
+      </p:sp>
     </p:spTree>
     <p:extLst>
       <p:ext uri="{BB962C8B-B14F-4D97-AF65-F5344CB8AC3E}">

</xml_diff>

<commit_message>
Atualiza documentação do sistema de chat.
</commit_message>
<xml_diff>
--- a/images/map-reduce-word-counting.pptx
+++ b/images/map-reduce-word-counting.pptx
@@ -4744,7 +4744,7 @@
           </a:prstGeom>
           <a:ln w="9525">
             <a:solidFill>
-              <a:schemeClr val="tx1"/>
+              <a:srgbClr val="7030A0"/>
             </a:solidFill>
             <a:headEnd type="none" w="med" len="sm"/>
             <a:tailEnd type="triangle" w="sm" len="sm"/>
@@ -4790,7 +4790,7 @@
           </a:prstGeom>
           <a:ln w="9525">
             <a:solidFill>
-              <a:schemeClr val="tx1"/>
+              <a:srgbClr val="7030A0"/>
             </a:solidFill>
             <a:headEnd type="none" w="med" len="sm"/>
             <a:tailEnd type="triangle" w="sm" len="sm"/>

</xml_diff>